<commit_message>
Updated week 10 file
</commit_message>
<xml_diff>
--- a/Week 10/Week 9 – Functional Design.pptx
+++ b/Week 10/Week 9 – Functional Design.pptx
@@ -224,7 +224,7 @@
           <a:p>
             <a:fld id="{E5CB2E47-6F41-409B-AD22-834AE1EFF186}" type="datetimeFigureOut">
               <a:rPr lang="en-US" smtClean="0"/>
-              <a:t>7/23/2019</a:t>
+              <a:t>30-Jul-19</a:t>
             </a:fld>
             <a:endParaRPr lang="en-US" dirty="0"/>
           </a:p>
@@ -389,7 +389,7 @@
           <a:p>
             <a:fld id="{FAD6744A-403D-42A1-BFE7-61DA46EE7C6C}" type="datetimeFigureOut">
               <a:rPr lang="en-US" smtClean="0"/>
-              <a:t>7/23/2019</a:t>
+              <a:t>30-Jul-19</a:t>
             </a:fld>
             <a:endParaRPr lang="en-US" dirty="0"/>
           </a:p>
@@ -1084,7 +1084,7 @@
           <a:p>
             <a:fld id="{349BF3EA-1A78-4F07-BDC0-C8A1BD461199}" type="datetimeFigureOut">
               <a:rPr lang="en-US" smtClean="0"/>
-              <a:t>7/23/2019</a:t>
+              <a:t>30-Jul-19</a:t>
             </a:fld>
             <a:endParaRPr lang="en-US" dirty="0"/>
           </a:p>
@@ -1268,7 +1268,7 @@
           <a:p>
             <a:fld id="{349BF3EA-1A78-4F07-BDC0-C8A1BD461199}" type="datetimeFigureOut">
               <a:rPr lang="en-US" smtClean="0"/>
-              <a:t>7/23/2019</a:t>
+              <a:t>30-Jul-19</a:t>
             </a:fld>
             <a:endParaRPr lang="en-US" dirty="0"/>
           </a:p>
@@ -1462,7 +1462,7 @@
           <a:p>
             <a:fld id="{349BF3EA-1A78-4F07-BDC0-C8A1BD461199}" type="datetimeFigureOut">
               <a:rPr lang="en-US" smtClean="0"/>
-              <a:t>7/23/2019</a:t>
+              <a:t>30-Jul-19</a:t>
             </a:fld>
             <a:endParaRPr lang="en-US" dirty="0"/>
           </a:p>
@@ -1651,7 +1651,7 @@
           <a:p>
             <a:fld id="{349BF3EA-1A78-4F07-BDC0-C8A1BD461199}" type="datetimeFigureOut">
               <a:rPr lang="en-US" smtClean="0"/>
-              <a:t>7/23/2019</a:t>
+              <a:t>30-Jul-19</a:t>
             </a:fld>
             <a:endParaRPr lang="en-US" dirty="0"/>
           </a:p>
@@ -2117,7 +2117,7 @@
           <a:p>
             <a:fld id="{349BF3EA-1A78-4F07-BDC0-C8A1BD461199}" type="datetimeFigureOut">
               <a:rPr lang="en-US" smtClean="0"/>
-              <a:t>7/23/2019</a:t>
+              <a:t>30-Jul-19</a:t>
             </a:fld>
             <a:endParaRPr lang="en-US" dirty="0"/>
           </a:p>
@@ -2363,7 +2363,7 @@
           <a:p>
             <a:fld id="{349BF3EA-1A78-4F07-BDC0-C8A1BD461199}" type="datetimeFigureOut">
               <a:rPr lang="en-US" smtClean="0"/>
-              <a:t>7/23/2019</a:t>
+              <a:t>30-Jul-19</a:t>
             </a:fld>
             <a:endParaRPr lang="en-US" dirty="0"/>
           </a:p>
@@ -2748,7 +2748,7 @@
           <a:p>
             <a:fld id="{349BF3EA-1A78-4F07-BDC0-C8A1BD461199}" type="datetimeFigureOut">
               <a:rPr lang="en-US" smtClean="0"/>
-              <a:t>7/23/2019</a:t>
+              <a:t>30-Jul-19</a:t>
             </a:fld>
             <a:endParaRPr lang="en-US" dirty="0"/>
           </a:p>
@@ -2880,7 +2880,7 @@
           <a:p>
             <a:fld id="{349BF3EA-1A78-4F07-BDC0-C8A1BD461199}" type="datetimeFigureOut">
               <a:rPr lang="en-US" smtClean="0"/>
-              <a:t>7/23/2019</a:t>
+              <a:t>30-Jul-19</a:t>
             </a:fld>
             <a:endParaRPr lang="en-US" dirty="0"/>
           </a:p>
@@ -2990,7 +2990,7 @@
           <a:p>
             <a:fld id="{349BF3EA-1A78-4F07-BDC0-C8A1BD461199}" type="datetimeFigureOut">
               <a:rPr lang="en-US" smtClean="0"/>
-              <a:t>7/23/2019</a:t>
+              <a:t>30-Jul-19</a:t>
             </a:fld>
             <a:endParaRPr lang="en-US" dirty="0"/>
           </a:p>
@@ -3334,7 +3334,7 @@
           <a:p>
             <a:fld id="{349BF3EA-1A78-4F07-BDC0-C8A1BD461199}" type="datetimeFigureOut">
               <a:rPr lang="en-US" smtClean="0"/>
-              <a:t>7/23/2019</a:t>
+              <a:t>30-Jul-19</a:t>
             </a:fld>
             <a:endParaRPr lang="en-US" dirty="0"/>
           </a:p>
@@ -3723,7 +3723,7 @@
           <a:p>
             <a:fld id="{349BF3EA-1A78-4F07-BDC0-C8A1BD461199}" type="datetimeFigureOut">
               <a:rPr lang="en-US" smtClean="0"/>
-              <a:t>7/23/2019</a:t>
+              <a:t>30-Jul-19</a:t>
             </a:fld>
             <a:endParaRPr lang="en-US" dirty="0"/>
           </a:p>
@@ -4085,7 +4085,7 @@
           <a:p>
             <a:fld id="{349BF3EA-1A78-4F07-BDC0-C8A1BD461199}" type="datetimeFigureOut">
               <a:rPr lang="en-US" smtClean="0"/>
-              <a:t>7/23/2019</a:t>
+              <a:t>30-Jul-19</a:t>
             </a:fld>
             <a:endParaRPr lang="en-US" dirty="0"/>
           </a:p>
@@ -4449,7 +4449,7 @@
           <a:p>
             <a:r>
               <a:rPr lang="en-US" dirty="0"/>
-              <a:t>Week 9 – Functional Design</a:t>
+              <a:t>Week 10 – Inputs</a:t>
             </a:r>
           </a:p>
         </p:txBody>
@@ -4945,21 +4945,15 @@
         <p:spPr/>
         <p:txBody>
           <a:bodyPr>
-            <a:normAutofit fontScale="90000"/>
+            <a:normAutofit/>
           </a:bodyPr>
           <a:lstStyle/>
           <a:p>
             <a:r>
               <a:rPr lang="en-US" b="1" dirty="0"/>
-              <a:t>Functional Design</a:t>
-            </a:r>
-            <a:br>
-              <a:rPr lang="en-US" dirty="0"/>
-            </a:br>
-            <a:r>
-              <a:rPr lang="en-US" sz="3600" dirty="0"/>
-              <a:t>Online Library System</a:t>
-            </a:r>
+              <a:t>Data input screen</a:t>
+            </a:r>
+            <a:endParaRPr lang="en-US" sz="3600" dirty="0"/>
           </a:p>
         </p:txBody>
       </p:sp>
@@ -4978,40 +4972,7 @@
           <a:bodyPr/>
           <a:lstStyle/>
           <a:p>
-            <a:r>
-              <a:rPr lang="en-US" dirty="0"/>
-              <a:t>Registration</a:t>
-            </a:r>
-          </a:p>
-          <a:p>
-            <a:r>
-              <a:rPr lang="en-US" dirty="0"/>
-              <a:t>Login</a:t>
-            </a:r>
-          </a:p>
-          <a:p>
-            <a:r>
-              <a:rPr lang="en-US" dirty="0"/>
-              <a:t>Borrow Book</a:t>
-            </a:r>
-          </a:p>
-          <a:p>
-            <a:r>
-              <a:rPr lang="en-US" dirty="0"/>
-              <a:t>Return Book</a:t>
-            </a:r>
-          </a:p>
-          <a:p>
-            <a:r>
-              <a:rPr lang="en-US" dirty="0"/>
-              <a:t>Calculate Fines</a:t>
-            </a:r>
-          </a:p>
-          <a:p>
-            <a:r>
-              <a:rPr lang="en-US" dirty="0"/>
-              <a:t>Generate Report</a:t>
-            </a:r>
+            <a:endParaRPr lang="en-US" dirty="0"/>
           </a:p>
         </p:txBody>
       </p:sp>

</xml_diff>